<commit_message>
updated plots for presentation
</commit_message>
<xml_diff>
--- a/asapresentation2025_ap.pptx
+++ b/asapresentation2025_ap.pptx
@@ -126,6 +126,11 @@
       </a:defRPr>
     </a:lvl9pPr>
   </p:defaultTextStyle>
+  <p:extLst>
+    <p:ext uri="{EFAFB233-063F-42B5-8137-9DF3F51BA10A}">
+      <p15:sldGuideLst xmlns:p15="http://schemas.microsoft.com/office/powerpoint/2012/main"/>
+    </p:ext>
+  </p:extLst>
 </p:presentation>
 </file>
 
@@ -211,7 +216,7 @@
           <a:p>
             <a:fld id="{25F860D4-F9B1-F245-94C1-80629213C536}" type="datetimeFigureOut">
               <a:rPr lang="en-US" smtClean="0"/>
-              <a:t>8/6/25</a:t>
+              <a:t>8/10/25</a:t>
             </a:fld>
             <a:endParaRPr lang="en-US"/>
           </a:p>
@@ -609,10 +614,7 @@
           <a:bodyPr/>
           <a:lstStyle/>
           <a:p>
-            <a:r>
-              <a:rPr lang="en-US" dirty="0"/>
-              <a:t>Don’t hit survey weights as hard</a:t>
-            </a:r>
+            <a:endParaRPr lang="en-US" dirty="0"/>
           </a:p>
         </p:txBody>
       </p:sp>
@@ -1057,7 +1059,7 @@
           <a:p>
             <a:fld id="{BF823222-D84E-3946-AB36-A075115B545A}" type="datetimeFigureOut">
               <a:rPr lang="en-US" smtClean="0"/>
-              <a:t>8/5/25</a:t>
+              <a:t>8/10/25</a:t>
             </a:fld>
             <a:endParaRPr lang="en-US"/>
           </a:p>
@@ -1255,7 +1257,7 @@
           <a:p>
             <a:fld id="{BF823222-D84E-3946-AB36-A075115B545A}" type="datetimeFigureOut">
               <a:rPr lang="en-US" smtClean="0"/>
-              <a:t>8/5/25</a:t>
+              <a:t>8/10/25</a:t>
             </a:fld>
             <a:endParaRPr lang="en-US"/>
           </a:p>
@@ -1463,7 +1465,7 @@
           <a:p>
             <a:fld id="{BF823222-D84E-3946-AB36-A075115B545A}" type="datetimeFigureOut">
               <a:rPr lang="en-US" smtClean="0"/>
-              <a:t>8/5/25</a:t>
+              <a:t>8/10/25</a:t>
             </a:fld>
             <a:endParaRPr lang="en-US"/>
           </a:p>
@@ -1661,7 +1663,7 @@
           <a:p>
             <a:fld id="{BF823222-D84E-3946-AB36-A075115B545A}" type="datetimeFigureOut">
               <a:rPr lang="en-US" smtClean="0"/>
-              <a:t>8/5/25</a:t>
+              <a:t>8/10/25</a:t>
             </a:fld>
             <a:endParaRPr lang="en-US"/>
           </a:p>
@@ -1936,7 +1938,7 @@
           <a:p>
             <a:fld id="{BF823222-D84E-3946-AB36-A075115B545A}" type="datetimeFigureOut">
               <a:rPr lang="en-US" smtClean="0"/>
-              <a:t>8/5/25</a:t>
+              <a:t>8/10/25</a:t>
             </a:fld>
             <a:endParaRPr lang="en-US"/>
           </a:p>
@@ -2201,7 +2203,7 @@
           <a:p>
             <a:fld id="{BF823222-D84E-3946-AB36-A075115B545A}" type="datetimeFigureOut">
               <a:rPr lang="en-US" smtClean="0"/>
-              <a:t>8/5/25</a:t>
+              <a:t>8/10/25</a:t>
             </a:fld>
             <a:endParaRPr lang="en-US"/>
           </a:p>
@@ -2613,7 +2615,7 @@
           <a:p>
             <a:fld id="{BF823222-D84E-3946-AB36-A075115B545A}" type="datetimeFigureOut">
               <a:rPr lang="en-US" smtClean="0"/>
-              <a:t>8/5/25</a:t>
+              <a:t>8/10/25</a:t>
             </a:fld>
             <a:endParaRPr lang="en-US"/>
           </a:p>
@@ -2754,7 +2756,7 @@
           <a:p>
             <a:fld id="{BF823222-D84E-3946-AB36-A075115B545A}" type="datetimeFigureOut">
               <a:rPr lang="en-US" smtClean="0"/>
-              <a:t>8/5/25</a:t>
+              <a:t>8/10/25</a:t>
             </a:fld>
             <a:endParaRPr lang="en-US"/>
           </a:p>
@@ -2867,7 +2869,7 @@
           <a:p>
             <a:fld id="{BF823222-D84E-3946-AB36-A075115B545A}" type="datetimeFigureOut">
               <a:rPr lang="en-US" smtClean="0"/>
-              <a:t>8/5/25</a:t>
+              <a:t>8/10/25</a:t>
             </a:fld>
             <a:endParaRPr lang="en-US"/>
           </a:p>
@@ -3178,7 +3180,7 @@
           <a:p>
             <a:fld id="{BF823222-D84E-3946-AB36-A075115B545A}" type="datetimeFigureOut">
               <a:rPr lang="en-US" smtClean="0"/>
-              <a:t>8/5/25</a:t>
+              <a:t>8/10/25</a:t>
             </a:fld>
             <a:endParaRPr lang="en-US"/>
           </a:p>
@@ -3466,7 +3468,7 @@
           <a:p>
             <a:fld id="{BF823222-D84E-3946-AB36-A075115B545A}" type="datetimeFigureOut">
               <a:rPr lang="en-US" smtClean="0"/>
-              <a:t>8/5/25</a:t>
+              <a:t>8/10/25</a:t>
             </a:fld>
             <a:endParaRPr lang="en-US"/>
           </a:p>
@@ -3707,7 +3709,7 @@
           <a:p>
             <a:fld id="{BF823222-D84E-3946-AB36-A075115B545A}" type="datetimeFigureOut">
               <a:rPr lang="en-US" smtClean="0"/>
-              <a:t>8/5/25</a:t>
+              <a:t>8/10/25</a:t>
             </a:fld>
             <a:endParaRPr lang="en-US"/>
           </a:p>
@@ -4636,10 +4638,10 @@
       </p:sp>
       <p:pic>
         <p:nvPicPr>
-          <p:cNvPr id="8" name="Picture 7" descr="A graph with lines and dots&#10;&#10;AI-generated content may be incorrect.">
-            <a:extLst>
-              <a:ext uri="{FF2B5EF4-FFF2-40B4-BE49-F238E27FC236}">
-                <a16:creationId xmlns:a16="http://schemas.microsoft.com/office/drawing/2014/main" id="{F58EC4E4-6525-4320-EAD4-83498FD6C1B4}"/>
+          <p:cNvPr id="4" name="Picture 3" descr="A graph with red and blue lines&#10;&#10;AI-generated content may be incorrect.">
+            <a:extLst>
+              <a:ext uri="{FF2B5EF4-FFF2-40B4-BE49-F238E27FC236}">
+                <a16:creationId xmlns:a16="http://schemas.microsoft.com/office/drawing/2014/main" id="{6DE7A5CD-F1EC-B763-70FF-43FB27DE73E4}"/>
               </a:ext>
             </a:extLst>
           </p:cNvPr>
@@ -4656,8 +4658,8 @@
         </p:blipFill>
         <p:spPr>
           <a:xfrm>
-            <a:off x="1431694" y="1371600"/>
-            <a:ext cx="9328612" cy="5486400"/>
+            <a:off x="1252956" y="1371600"/>
+            <a:ext cx="9686088" cy="5486400"/>
           </a:xfrm>
           <a:prstGeom prst="rect">
             <a:avLst/>
@@ -4730,10 +4732,10 @@
       </p:sp>
       <p:pic>
         <p:nvPicPr>
-          <p:cNvPr id="7" name="Picture 6" descr="A graph with lines and numbers&#10;&#10;AI-generated content may be incorrect.">
-            <a:extLst>
-              <a:ext uri="{FF2B5EF4-FFF2-40B4-BE49-F238E27FC236}">
-                <a16:creationId xmlns:a16="http://schemas.microsoft.com/office/drawing/2014/main" id="{309AB86A-1E6E-91F5-F496-0375A41BE192}"/>
+          <p:cNvPr id="4" name="Picture 3" descr="A graph with lines and numbers&#10;&#10;AI-generated content may be incorrect.">
+            <a:extLst>
+              <a:ext uri="{FF2B5EF4-FFF2-40B4-BE49-F238E27FC236}">
+                <a16:creationId xmlns:a16="http://schemas.microsoft.com/office/drawing/2014/main" id="{1886F4B4-960F-0B3D-508B-6BED567578F5}"/>
               </a:ext>
             </a:extLst>
           </p:cNvPr>
@@ -4750,8 +4752,8 @@
         </p:blipFill>
         <p:spPr>
           <a:xfrm>
-            <a:off x="1431694" y="1371600"/>
-            <a:ext cx="9328612" cy="5486400"/>
+            <a:off x="1252956" y="1371600"/>
+            <a:ext cx="9686087" cy="5486400"/>
           </a:xfrm>
           <a:prstGeom prst="rect">
             <a:avLst/>
@@ -4853,7 +4855,15 @@
             <a:pPr lvl="2"/>
             <a:r>
               <a:rPr lang="en-US" dirty="0"/>
-              <a:t>Thornburg, et al. (2024) report that the Dobbs decision increased women’s PHQ-4 scores by about 0.11 points</a:t>
+              <a:t>Thornburg, et al. (2024) report that the </a:t>
+            </a:r>
+            <a:r>
+              <a:rPr lang="en-US" i="1" dirty="0"/>
+              <a:t>Dobbs</a:t>
+            </a:r>
+            <a:r>
+              <a:rPr lang="en-US" dirty="0"/>
+              <a:t> decision increased women’s PHQ-4 scores by about 0.11 points</a:t>
             </a:r>
           </a:p>
           <a:p>
@@ -5882,7 +5892,7 @@
             </a:r>
             <a:r>
               <a:rPr lang="en-US" sz="1800" dirty="0"/>
-              <a:t>, syllabus)</a:t>
+              <a:t>)</a:t>
             </a:r>
             <a:endParaRPr lang="en-US" sz="1800" b="1" dirty="0"/>
           </a:p>
@@ -6959,8 +6969,8 @@
         </p:nvSpPr>
         <p:spPr>
           <a:xfrm>
-            <a:off x="5663566" y="5169569"/>
-            <a:ext cx="172278" cy="172278"/>
+            <a:off x="5597781" y="5058803"/>
+            <a:ext cx="303058" cy="302779"/>
           </a:xfrm>
           <a:prstGeom prst="star5">
             <a:avLst/>
@@ -7620,22 +7630,16 @@
             <a:pPr lvl="1"/>
             <a:r>
               <a:rPr lang="en-US" dirty="0"/>
-              <a:t>Sample is large (~60k per wave), but response rate is low (between 5% and 10%); survey weights are essential for analysis</a:t>
+              <a:t>Sample is large (~60k per wave), but response rate is low (between 5% and 10%)</a:t>
             </a:r>
           </a:p>
           <a:p>
             <a:pPr lvl="1"/>
             <a:r>
               <a:rPr lang="en-US" dirty="0"/>
-              <a:t>Includes questions about COVID, person-level characteristics, household-level characteristics, and mental health</a:t>
-            </a:r>
-          </a:p>
-          <a:p>
-            <a:pPr lvl="2"/>
-            <a:r>
-              <a:rPr lang="en-US" b="1" dirty="0"/>
-              <a:t>PHQ-4</a:t>
-            </a:r>
+              <a:t>Mental health measure: PHQ-4</a:t>
+            </a:r>
+            <a:endParaRPr lang="en-US" b="1" dirty="0"/>
           </a:p>
           <a:p>
             <a:pPr lvl="1"/>
@@ -7907,15 +7911,33 @@
                                   </p:childTnLst>
                                 </p:cTn>
                               </p:par>
+                            </p:childTnLst>
+                          </p:cTn>
+                        </p:par>
+                      </p:childTnLst>
+                    </p:cTn>
+                  </p:par>
+                  <p:par>
+                    <p:cTn id="23" fill="hold">
+                      <p:stCondLst>
+                        <p:cond delay="indefinite"/>
+                      </p:stCondLst>
+                      <p:childTnLst>
+                        <p:par>
+                          <p:cTn id="24" fill="hold">
+                            <p:stCondLst>
+                              <p:cond delay="0"/>
+                            </p:stCondLst>
+                            <p:childTnLst>
                               <p:par>
-                                <p:cTn id="23" presetID="1" presetClass="entr" presetSubtype="0" fill="hold" grpId="0" nodeType="withEffect">
+                                <p:cTn id="25" presetID="1" presetClass="entr" presetSubtype="0" fill="hold" grpId="0" nodeType="clickEffect">
                                   <p:stCondLst>
                                     <p:cond delay="0"/>
                                   </p:stCondLst>
                                   <p:childTnLst>
                                     <p:set>
                                       <p:cBhvr>
-                                        <p:cTn id="24" dur="1" fill="hold">
+                                        <p:cTn id="26" dur="1" fill="hold">
                                           <p:stCondLst>
                                             <p:cond delay="0"/>
                                           </p:stCondLst>
@@ -7924,55 +7946,6 @@
                                           <p:spTgt spid="3">
                                             <p:txEl>
                                               <p:pRg st="5" end="5"/>
-                                            </p:txEl>
-                                          </p:spTgt>
-                                        </p:tgtEl>
-                                        <p:attrNameLst>
-                                          <p:attrName>style.visibility</p:attrName>
-                                        </p:attrNameLst>
-                                      </p:cBhvr>
-                                      <p:to>
-                                        <p:strVal val="visible"/>
-                                      </p:to>
-                                    </p:set>
-                                  </p:childTnLst>
-                                </p:cTn>
-                              </p:par>
-                            </p:childTnLst>
-                          </p:cTn>
-                        </p:par>
-                      </p:childTnLst>
-                    </p:cTn>
-                  </p:par>
-                  <p:par>
-                    <p:cTn id="25" fill="hold">
-                      <p:stCondLst>
-                        <p:cond delay="indefinite"/>
-                      </p:stCondLst>
-                      <p:childTnLst>
-                        <p:par>
-                          <p:cTn id="26" fill="hold">
-                            <p:stCondLst>
-                              <p:cond delay="0"/>
-                            </p:stCondLst>
-                            <p:childTnLst>
-                              <p:par>
-                                <p:cTn id="27" presetID="1" presetClass="entr" presetSubtype="0" fill="hold" grpId="0" nodeType="clickEffect">
-                                  <p:stCondLst>
-                                    <p:cond delay="0"/>
-                                  </p:stCondLst>
-                                  <p:childTnLst>
-                                    <p:set>
-                                      <p:cBhvr>
-                                        <p:cTn id="28" dur="1" fill="hold">
-                                          <p:stCondLst>
-                                            <p:cond delay="0"/>
-                                          </p:stCondLst>
-                                        </p:cTn>
-                                        <p:tgtEl>
-                                          <p:spTgt spid="3">
-                                            <p:txEl>
-                                              <p:pRg st="6" end="6"/>
                                             </p:txEl>
                                           </p:spTgt>
                                         </p:tgtEl>

</xml_diff>